<commit_message>
Add XmlAdaptedRelationship to class diagram
</commit_message>
<xml_diff>
--- a/docs/diagrams/LogicComponentClassDiagram.pptx
+++ b/docs/diagrams/LogicComponentClassDiagram.pptx
@@ -212,7 +212,7 @@
           <a:p>
             <a:fld id="{F5CC4B3F-88C1-4FFA-B1B6-F41C21DC6924}" type="datetimeFigureOut">
               <a:rPr lang="en-US" smtClean="0"/>
-              <a:t>7/20/17</a:t>
+              <a:t>11/13/2017</a:t>
             </a:fld>
             <a:endParaRPr lang="en-US"/>
           </a:p>
@@ -658,7 +658,7 @@
           <a:p>
             <a:fld id="{78C97017-6FC3-485B-9764-EAC9E56C1D49}" type="datetimeFigureOut">
               <a:rPr lang="en-US" smtClean="0"/>
-              <a:t>7/20/17</a:t>
+              <a:t>11/13/2017</a:t>
             </a:fld>
             <a:endParaRPr lang="en-US"/>
           </a:p>
@@ -826,7 +826,7 @@
           <a:p>
             <a:fld id="{78C97017-6FC3-485B-9764-EAC9E56C1D49}" type="datetimeFigureOut">
               <a:rPr lang="en-US" smtClean="0"/>
-              <a:t>7/20/17</a:t>
+              <a:t>11/13/2017</a:t>
             </a:fld>
             <a:endParaRPr lang="en-US"/>
           </a:p>
@@ -1004,7 +1004,7 @@
           <a:p>
             <a:fld id="{78C97017-6FC3-485B-9764-EAC9E56C1D49}" type="datetimeFigureOut">
               <a:rPr lang="en-US" smtClean="0"/>
-              <a:t>7/20/17</a:t>
+              <a:t>11/13/2017</a:t>
             </a:fld>
             <a:endParaRPr lang="en-US"/>
           </a:p>
@@ -1172,7 +1172,7 @@
           <a:p>
             <a:fld id="{78C97017-6FC3-485B-9764-EAC9E56C1D49}" type="datetimeFigureOut">
               <a:rPr lang="en-US" smtClean="0"/>
-              <a:t>7/20/17</a:t>
+              <a:t>11/13/2017</a:t>
             </a:fld>
             <a:endParaRPr lang="en-US"/>
           </a:p>
@@ -1417,7 +1417,7 @@
           <a:p>
             <a:fld id="{78C97017-6FC3-485B-9764-EAC9E56C1D49}" type="datetimeFigureOut">
               <a:rPr lang="en-US" smtClean="0"/>
-              <a:t>7/20/17</a:t>
+              <a:t>11/13/2017</a:t>
             </a:fld>
             <a:endParaRPr lang="en-US"/>
           </a:p>
@@ -1702,7 +1702,7 @@
           <a:p>
             <a:fld id="{78C97017-6FC3-485B-9764-EAC9E56C1D49}" type="datetimeFigureOut">
               <a:rPr lang="en-US" smtClean="0"/>
-              <a:t>7/20/17</a:t>
+              <a:t>11/13/2017</a:t>
             </a:fld>
             <a:endParaRPr lang="en-US"/>
           </a:p>
@@ -2121,7 +2121,7 @@
           <a:p>
             <a:fld id="{78C97017-6FC3-485B-9764-EAC9E56C1D49}" type="datetimeFigureOut">
               <a:rPr lang="en-US" smtClean="0"/>
-              <a:t>7/20/17</a:t>
+              <a:t>11/13/2017</a:t>
             </a:fld>
             <a:endParaRPr lang="en-US"/>
           </a:p>
@@ -2238,7 +2238,7 @@
           <a:p>
             <a:fld id="{78C97017-6FC3-485B-9764-EAC9E56C1D49}" type="datetimeFigureOut">
               <a:rPr lang="en-US" smtClean="0"/>
-              <a:t>7/20/17</a:t>
+              <a:t>11/13/2017</a:t>
             </a:fld>
             <a:endParaRPr lang="en-US"/>
           </a:p>
@@ -2333,7 +2333,7 @@
           <a:p>
             <a:fld id="{78C97017-6FC3-485B-9764-EAC9E56C1D49}" type="datetimeFigureOut">
               <a:rPr lang="en-US" smtClean="0"/>
-              <a:t>7/20/17</a:t>
+              <a:t>11/13/2017</a:t>
             </a:fld>
             <a:endParaRPr lang="en-US"/>
           </a:p>
@@ -2608,7 +2608,7 @@
           <a:p>
             <a:fld id="{78C97017-6FC3-485B-9764-EAC9E56C1D49}" type="datetimeFigureOut">
               <a:rPr lang="en-US" smtClean="0"/>
-              <a:t>7/20/17</a:t>
+              <a:t>11/13/2017</a:t>
             </a:fld>
             <a:endParaRPr lang="en-US"/>
           </a:p>
@@ -2860,7 +2860,7 @@
           <a:p>
             <a:fld id="{78C97017-6FC3-485B-9764-EAC9E56C1D49}" type="datetimeFigureOut">
               <a:rPr lang="en-US" smtClean="0"/>
-              <a:t>7/20/17</a:t>
+              <a:t>11/13/2017</a:t>
             </a:fld>
             <a:endParaRPr lang="en-US"/>
           </a:p>
@@ -3071,7 +3071,7 @@
           <a:p>
             <a:fld id="{78C97017-6FC3-485B-9764-EAC9E56C1D49}" type="datetimeFigureOut">
               <a:rPr lang="en-US" smtClean="0"/>
-              <a:t>7/20/17</a:t>
+              <a:t>11/13/2017</a:t>
             </a:fld>
             <a:endParaRPr lang="en-US"/>
           </a:p>
@@ -3607,7 +3607,7 @@
           <a:p>
             <a:pPr algn="ctr"/>
             <a:r>
-              <a:rPr lang="en-US" sz="1050" b="1" dirty="0" err="1" smtClean="0">
+              <a:rPr lang="en-US" sz="1050" b="1" dirty="0" err="1">
                 <a:solidFill>
                   <a:srgbClr val="0070C0"/>
                 </a:solidFill>
@@ -3939,7 +3939,7 @@
           <a:p>
             <a:pPr algn="ctr"/>
             <a:r>
-              <a:rPr lang="en-US" sz="1050" dirty="0" err="1" smtClean="0">
+              <a:rPr lang="en-US" sz="1050" dirty="0" err="1">
                 <a:solidFill>
                   <a:schemeClr val="bg1"/>
                 </a:solidFill>
@@ -3974,13 +3974,13 @@
         <p:nvCxnSpPr>
           <p:cNvPr id="18" name="Straight Arrow Connector 110"/>
           <p:cNvCxnSpPr>
-            <a:stCxn id="12" idx="2"/>
+            <a:cxnSpLocks/>
           </p:cNvCxnSpPr>
           <p:nvPr/>
         </p:nvCxnSpPr>
         <p:spPr>
           <a:xfrm>
-            <a:off x="7362894" y="4495800"/>
+            <a:off x="7467600" y="4495799"/>
             <a:ext cx="0" cy="281555"/>
           </a:xfrm>
           <a:prstGeom prst="straightConnector1">
@@ -5517,7 +5517,7 @@
           <p:cNvPr id="97" name="Rectangle 96">
             <a:extLst>
               <a:ext uri="{FF2B5EF4-FFF2-40B4-BE49-F238E27FC236}">
-                <a16:creationId xmlns="" xmlns:a16="http://schemas.microsoft.com/office/drawing/2014/main" id="{AADE6A0C-89AB-467B-8CEA-5FCF36CE0D21}"/>
+                <a16:creationId xmlns:a16="http://schemas.microsoft.com/office/drawing/2014/main" id="{AADE6A0C-89AB-467B-8CEA-5FCF36CE0D21}"/>
               </a:ext>
             </a:extLst>
           </p:cNvPr>
@@ -5815,7 +5815,7 @@
           <a:p>
             <a:pPr algn="ctr"/>
             <a:r>
-              <a:rPr lang="en-US" sz="1050" b="1" dirty="0" err="1" smtClean="0">
+              <a:rPr lang="en-US" sz="1050" b="1" dirty="0" err="1">
                 <a:solidFill>
                   <a:schemeClr val="bg1"/>
                 </a:solidFill>
@@ -6165,7 +6165,7 @@
           <a:p>
             <a:pPr algn="ctr"/>
             <a:r>
-              <a:rPr lang="en-US" sz="1050" dirty="0" err="1" smtClean="0">
+              <a:rPr lang="en-US" sz="1050" dirty="0" err="1">
                 <a:solidFill>
                   <a:schemeClr val="bg1"/>
                 </a:solidFill>
@@ -6173,7 +6173,7 @@
               <a:t>XYZCommand</a:t>
             </a:r>
             <a:r>
-              <a:rPr lang="en-US" sz="1050" dirty="0" smtClean="0">
+              <a:rPr lang="en-US" sz="1050" dirty="0">
                 <a:solidFill>
                   <a:schemeClr val="bg1"/>
                 </a:solidFill>
@@ -6181,7 +6181,7 @@
               <a:t> = </a:t>
             </a:r>
             <a:r>
-              <a:rPr lang="en-US" sz="1050" dirty="0" err="1" smtClean="0">
+              <a:rPr lang="en-US" sz="1050" dirty="0" err="1">
                 <a:solidFill>
                   <a:schemeClr val="bg1"/>
                 </a:solidFill>
@@ -6189,7 +6189,7 @@
               <a:t>AddCommand</a:t>
             </a:r>
             <a:r>
-              <a:rPr lang="en-US" sz="1050" dirty="0" smtClean="0">
+              <a:rPr lang="en-US" sz="1050" dirty="0">
                 <a:solidFill>
                   <a:schemeClr val="bg1"/>
                 </a:solidFill>
@@ -6197,7 +6197,7 @@
               <a:t>, </a:t>
             </a:r>
             <a:r>
-              <a:rPr lang="en-US" sz="1050" dirty="0" err="1" smtClean="0">
+              <a:rPr lang="en-US" sz="1050" dirty="0" err="1">
                 <a:solidFill>
                   <a:schemeClr val="bg1"/>
                 </a:solidFill>
@@ -6205,18 +6205,13 @@
               <a:t>FindCommand</a:t>
             </a:r>
             <a:r>
-              <a:rPr lang="en-US" sz="1050" dirty="0" smtClean="0">
+              <a:rPr lang="en-US" sz="1050" dirty="0">
                 <a:solidFill>
                   <a:schemeClr val="bg1"/>
                 </a:solidFill>
               </a:rPr>
               <a:t>, etc.</a:t>
             </a:r>
-            <a:endParaRPr lang="en-US" sz="1050" dirty="0">
-              <a:solidFill>
-                <a:schemeClr val="bg1"/>
-              </a:solidFill>
-            </a:endParaRPr>
           </a:p>
         </p:txBody>
       </p:sp>
@@ -6264,14 +6259,14 @@
           <a:p>
             <a:pPr algn="ctr"/>
             <a:r>
-              <a:rPr lang="en-US" sz="1050" dirty="0" err="1" smtClean="0">
+              <a:rPr lang="en-US" sz="1050" dirty="0" err="1">
                 <a:solidFill>
                   <a:schemeClr val="bg1"/>
                 </a:solidFill>
               </a:rPr>
               <a:t>UndoRedo</a:t>
             </a:r>
-            <a:endParaRPr lang="en-US" sz="1050" dirty="0" smtClean="0">
+            <a:endParaRPr lang="en-US" sz="1050" dirty="0">
               <a:solidFill>
                 <a:schemeClr val="bg1"/>
               </a:solidFill>
@@ -6280,7 +6275,7 @@
           <a:p>
             <a:pPr algn="ctr"/>
             <a:r>
-              <a:rPr lang="en-US" sz="1050" dirty="0" smtClean="0">
+              <a:rPr lang="en-US" sz="1050" dirty="0">
                 <a:solidFill>
                   <a:schemeClr val="bg1"/>
                 </a:solidFill>
@@ -6374,6 +6369,165 @@
           </a:p>
         </p:txBody>
       </p:sp>
+      <p:sp>
+        <p:nvSpPr>
+          <p:cNvPr id="64" name="Rectangle 65">
+            <a:extLst>
+              <a:ext uri="{FF2B5EF4-FFF2-40B4-BE49-F238E27FC236}">
+                <a16:creationId xmlns:a16="http://schemas.microsoft.com/office/drawing/2014/main" id="{E70DE3A1-14A8-4BA5-B400-58B97059F0FA}"/>
+              </a:ext>
+            </a:extLst>
+          </p:cNvPr>
+          <p:cNvSpPr/>
+          <p:nvPr/>
+        </p:nvSpPr>
+        <p:spPr>
+          <a:xfrm>
+            <a:off x="1109249" y="5190918"/>
+            <a:ext cx="7050315" cy="328045"/>
+          </a:xfrm>
+          <a:prstGeom prst="roundRect">
+            <a:avLst/>
+          </a:prstGeom>
+          <a:solidFill>
+            <a:schemeClr val="accent4">
+              <a:lumMod val="20000"/>
+              <a:lumOff val="80000"/>
+            </a:schemeClr>
+          </a:solidFill>
+          <a:ln w="19050">
+            <a:noFill/>
+          </a:ln>
+          <a:effectLst/>
+        </p:spPr>
+        <p:style>
+          <a:lnRef idx="1">
+            <a:schemeClr val="accent2"/>
+          </a:lnRef>
+          <a:fillRef idx="2">
+            <a:schemeClr val="accent2"/>
+          </a:fillRef>
+          <a:effectRef idx="1">
+            <a:schemeClr val="accent2"/>
+          </a:effectRef>
+          <a:fontRef idx="minor">
+            <a:schemeClr val="dk1"/>
+          </a:fontRef>
+        </p:style>
+        <p:txBody>
+          <a:bodyPr rtlCol="0" anchor="ctr"/>
+          <a:lstStyle/>
+          <a:p>
+            <a:pPr algn="ctr"/>
+            <a:r>
+              <a:rPr lang="en-US" sz="1100" b="1" dirty="0">
+                <a:solidFill>
+                  <a:schemeClr val="bg1"/>
+                </a:solidFill>
+              </a:rPr>
+              <a:t>Storage</a:t>
+            </a:r>
+            <a:endParaRPr lang="en-SG" sz="1100" b="1" dirty="0">
+              <a:solidFill>
+                <a:schemeClr val="bg1"/>
+              </a:solidFill>
+            </a:endParaRPr>
+          </a:p>
+        </p:txBody>
+      </p:sp>
+      <p:cxnSp>
+        <p:nvCxnSpPr>
+          <p:cNvPr id="67" name="Straight Arrow Connector 110">
+            <a:extLst>
+              <a:ext uri="{FF2B5EF4-FFF2-40B4-BE49-F238E27FC236}">
+                <a16:creationId xmlns:a16="http://schemas.microsoft.com/office/drawing/2014/main" id="{3CFE5AA0-E779-4B2C-84B7-C205837AC904}"/>
+              </a:ext>
+            </a:extLst>
+          </p:cNvPr>
+          <p:cNvCxnSpPr>
+            <a:cxnSpLocks/>
+          </p:cNvCxnSpPr>
+          <p:nvPr/>
+        </p:nvCxnSpPr>
+        <p:spPr>
+          <a:xfrm>
+            <a:off x="7315200" y="4495799"/>
+            <a:ext cx="0" cy="695119"/>
+          </a:xfrm>
+          <a:prstGeom prst="straightConnector1">
+            <a:avLst/>
+          </a:prstGeom>
+          <a:ln w="19050">
+            <a:solidFill>
+              <a:srgbClr val="0070C0"/>
+            </a:solidFill>
+            <a:prstDash val="sysDot"/>
+            <a:headEnd type="none" w="med" len="med"/>
+            <a:tailEnd type="arrow" w="med" len="med"/>
+          </a:ln>
+          <a:effectLst/>
+        </p:spPr>
+        <p:style>
+          <a:lnRef idx="1">
+            <a:schemeClr val="accent2"/>
+          </a:lnRef>
+          <a:fillRef idx="2">
+            <a:schemeClr val="accent2"/>
+          </a:fillRef>
+          <a:effectRef idx="1">
+            <a:schemeClr val="accent2"/>
+          </a:effectRef>
+          <a:fontRef idx="minor">
+            <a:schemeClr val="dk1"/>
+          </a:fontRef>
+        </p:style>
+      </p:cxnSp>
+      <p:cxnSp>
+        <p:nvCxnSpPr>
+          <p:cNvPr id="71" name="Straight Arrow Connector 57">
+            <a:extLst>
+              <a:ext uri="{FF2B5EF4-FFF2-40B4-BE49-F238E27FC236}">
+                <a16:creationId xmlns:a16="http://schemas.microsoft.com/office/drawing/2014/main" id="{3B6ED347-1E20-445E-AA79-BB12E48A9629}"/>
+              </a:ext>
+            </a:extLst>
+          </p:cNvPr>
+          <p:cNvCxnSpPr>
+            <a:cxnSpLocks/>
+          </p:cNvCxnSpPr>
+          <p:nvPr/>
+        </p:nvCxnSpPr>
+        <p:spPr>
+          <a:xfrm>
+            <a:off x="2224823" y="3921313"/>
+            <a:ext cx="922" cy="1269605"/>
+          </a:xfrm>
+          <a:prstGeom prst="straightConnector1">
+            <a:avLst/>
+          </a:prstGeom>
+          <a:ln w="19050">
+            <a:solidFill>
+              <a:srgbClr val="0070C0"/>
+            </a:solidFill>
+            <a:headEnd type="none" w="med" len="med"/>
+            <a:tailEnd type="arrow" w="med" len="med"/>
+          </a:ln>
+          <a:effectLst/>
+        </p:spPr>
+        <p:style>
+          <a:lnRef idx="1">
+            <a:schemeClr val="accent2"/>
+          </a:lnRef>
+          <a:fillRef idx="2">
+            <a:schemeClr val="accent2"/>
+          </a:fillRef>
+          <a:effectRef idx="1">
+            <a:schemeClr val="accent2"/>
+          </a:effectRef>
+          <a:fontRef idx="minor">
+            <a:schemeClr val="dk1"/>
+          </a:fontRef>
+        </p:style>
+      </p:cxnSp>
     </p:spTree>
     <p:extLst>
       <p:ext uri="{BB962C8B-B14F-4D97-AF65-F5344CB8AC3E}">

</xml_diff>